<commit_message>
Update paste lab gif pptx
</commit_message>
<xml_diff>
--- a/doc/PasteLab gif.pptx
+++ b/doc/PasteLab gif.pptx
@@ -3189,10 +3189,10 @@
       </p:sp>
       <p:pic>
         <p:nvPicPr>
-          <p:cNvPr id="12" name="Picture 5">
+          <p:cNvPr id="11" name="Picture 10">
             <a:extLst>
               <a:ext uri="{FF2B5EF4-FFF2-40B4-BE49-F238E27FC236}">
-                <a16:creationId xmlns:a16="http://schemas.microsoft.com/office/drawing/2014/main" id="{FC379743-E6BE-4FCE-9712-7A153469F86D}"/>
+                <a16:creationId xmlns:a16="http://schemas.microsoft.com/office/drawing/2014/main" id="{60A5248E-9D26-414E-B3E8-5B6D35A2E2EF}"/>
               </a:ext>
             </a:extLst>
           </p:cNvPr>
@@ -3204,7 +3204,7 @@
         <p:blipFill>
           <a:blip r:embed="rId2" cstate="print">
             <a:duotone>
-              <a:schemeClr val="accent5">
+              <a:schemeClr val="accent1">
                 <a:shade val="45000"/>
                 <a:satMod val="135000"/>
               </a:schemeClr>
@@ -3216,6 +3216,7 @@
               </a:ext>
             </a:extLst>
           </a:blip>
+          <a:srcRect l="20312" t="8594" r="23698" b="6250"/>
           <a:stretch>
             <a:fillRect/>
           </a:stretch>
@@ -3223,22 +3224,19 @@
         <p:spPr>
           <a:xfrm>
             <a:off x="1143000" y="838200"/>
-            <a:ext cx="1447800" cy="1447800"/>
+            <a:ext cx="1351722" cy="1372630"/>
           </a:xfrm>
           <a:prstGeom prst="rect">
             <a:avLst/>
           </a:prstGeom>
-          <a:ln w="38100">
-            <a:noFill/>
-          </a:ln>
         </p:spPr>
       </p:pic>
       <p:pic>
         <p:nvPicPr>
-          <p:cNvPr id="14" name="0">
+          <p:cNvPr id="9" name="Picture 8">
             <a:extLst>
               <a:ext uri="{FF2B5EF4-FFF2-40B4-BE49-F238E27FC236}">
-                <a16:creationId xmlns:a16="http://schemas.microsoft.com/office/drawing/2014/main" id="{366F369F-289D-42E7-9693-E9354029C566}"/>
+                <a16:creationId xmlns:a16="http://schemas.microsoft.com/office/drawing/2014/main" id="{73F5D813-B506-4CB2-BBB5-1BAB2377D89F}"/>
               </a:ext>
             </a:extLst>
           </p:cNvPr>
@@ -3250,7 +3248,7 @@
         <p:blipFill>
           <a:blip r:embed="rId2" cstate="print">
             <a:duotone>
-              <a:schemeClr val="accent5">
+              <a:schemeClr val="accent1">
                 <a:shade val="45000"/>
                 <a:satMod val="135000"/>
               </a:schemeClr>
@@ -3262,6 +3260,7 @@
               </a:ext>
             </a:extLst>
           </a:blip>
+          <a:srcRect l="20312" t="8594" r="23698" b="6250"/>
           <a:stretch>
             <a:fillRect/>
           </a:stretch>
@@ -3269,7 +3268,7 @@
         <p:spPr>
           <a:xfrm>
             <a:off x="1143000" y="838200"/>
-            <a:ext cx="1447800" cy="1447800"/>
+            <a:ext cx="1351722" cy="1372630"/>
           </a:xfrm>
           <a:prstGeom prst="rect">
             <a:avLst/>
@@ -3324,7 +3323,7 @@
                               <p:par>
                                 <p:cTn id="5" presetID="10" presetClass="entr" presetSubtype="0" fill="hold" nodeType="clickEffect">
                                   <p:stCondLst>
-                                    <p:cond delay="1000"/>
+                                    <p:cond delay="500"/>
                                   </p:stCondLst>
                                   <p:childTnLst>
                                     <p:set>
@@ -3335,7 +3334,7 @@
                                           </p:stCondLst>
                                         </p:cTn>
                                         <p:tgtEl>
-                                          <p:spTgt spid="14"/>
+                                          <p:spTgt spid="9"/>
                                         </p:tgtEl>
                                         <p:attrNameLst>
                                           <p:attrName>style.visibility</p:attrName>
@@ -3349,7 +3348,7 @@
                                       <p:cBhvr>
                                         <p:cTn id="7" dur="500"/>
                                         <p:tgtEl>
-                                          <p:spTgt spid="14"/>
+                                          <p:spTgt spid="9"/>
                                         </p:tgtEl>
                                       </p:cBhvr>
                                     </p:animEffect>
@@ -3362,20 +3361,20 @@
                         <p:par>
                           <p:cTn id="8" fill="hold">
                             <p:stCondLst>
-                              <p:cond delay="1500"/>
+                              <p:cond delay="1000"/>
                             </p:stCondLst>
                             <p:childTnLst>
                               <p:par>
                                 <p:cTn id="9" presetID="10" presetClass="exit" presetSubtype="0" fill="hold" nodeType="afterEffect">
                                   <p:stCondLst>
-                                    <p:cond delay="800"/>
+                                    <p:cond delay="500"/>
                                   </p:stCondLst>
                                   <p:childTnLst>
                                     <p:animEffect transition="out" filter="fade">
                                       <p:cBhvr>
                                         <p:cTn id="10" dur="500"/>
                                         <p:tgtEl>
-                                          <p:spTgt spid="14"/>
+                                          <p:spTgt spid="9"/>
                                         </p:tgtEl>
                                       </p:cBhvr>
                                     </p:animEffect>
@@ -3387,7 +3386,7 @@
                                           </p:stCondLst>
                                         </p:cTn>
                                         <p:tgtEl>
-                                          <p:spTgt spid="14"/>
+                                          <p:spTgt spid="9"/>
                                         </p:tgtEl>
                                         <p:attrNameLst>
                                           <p:attrName>style.visibility</p:attrName>
@@ -3450,10 +3449,10 @@
       </p:grpSpPr>
       <p:pic>
         <p:nvPicPr>
-          <p:cNvPr id="7" name="Picture 5">
+          <p:cNvPr id="9" name="Picture 8">
             <a:extLst>
               <a:ext uri="{FF2B5EF4-FFF2-40B4-BE49-F238E27FC236}">
-                <a16:creationId xmlns:a16="http://schemas.microsoft.com/office/drawing/2014/main" id="{9858904C-3EBF-47BF-861B-3793D9F97072}"/>
+                <a16:creationId xmlns:a16="http://schemas.microsoft.com/office/drawing/2014/main" id="{6D6620AF-B1B8-48B4-AE00-3246DCF243CD}"/>
               </a:ext>
             </a:extLst>
           </p:cNvPr>
@@ -3465,7 +3464,7 @@
         <p:blipFill>
           <a:blip r:embed="rId2" cstate="print">
             <a:duotone>
-              <a:schemeClr val="accent5">
+              <a:schemeClr val="accent1">
                 <a:shade val="45000"/>
                 <a:satMod val="135000"/>
               </a:schemeClr>
@@ -3477,21 +3476,19 @@
               </a:ext>
             </a:extLst>
           </a:blip>
+          <a:srcRect l="20312" t="8594" r="23698" b="6250"/>
           <a:stretch>
             <a:fillRect/>
           </a:stretch>
         </p:blipFill>
         <p:spPr>
           <a:xfrm>
-            <a:off x="1143000" y="1066800"/>
-            <a:ext cx="1447800" cy="1447800"/>
+            <a:off x="1191038" y="1100616"/>
+            <a:ext cx="1351722" cy="1372630"/>
           </a:xfrm>
           <a:prstGeom prst="rect">
             <a:avLst/>
           </a:prstGeom>
-          <a:ln w="38100">
-            <a:noFill/>
-          </a:ln>
         </p:spPr>
       </p:pic>
       <p:sp>
@@ -3684,7 +3681,7 @@
                                           </p:stCondLst>
                                         </p:cTn>
                                         <p:tgtEl>
-                                          <p:spTgt spid="7"/>
+                                          <p:spTgt spid="9"/>
                                         </p:tgtEl>
                                         <p:attrNameLst>
                                           <p:attrName>style.visibility</p:attrName>
@@ -3698,7 +3695,7 @@
                                       <p:cBhvr>
                                         <p:cTn id="12" dur="500"/>
                                         <p:tgtEl>
-                                          <p:spTgt spid="7"/>
+                                          <p:spTgt spid="9"/>
                                         </p:tgtEl>
                                       </p:cBhvr>
                                     </p:animEffect>
@@ -3715,7 +3712,7 @@
                                       <p:cBhvr>
                                         <p:cTn id="14" dur="3000" fill="hold"/>
                                         <p:tgtEl>
-                                          <p:spTgt spid="7"/>
+                                          <p:spTgt spid="9"/>
                                         </p:tgtEl>
                                         <p:attrNameLst>
                                           <p:attrName>r</p:attrName>

</xml_diff>

<commit_message>
Add pptx for website front page gifs
</commit_message>
<xml_diff>
--- a/doc/PasteLab gif.pptx
+++ b/doc/PasteLab gif.pptx
@@ -307,7 +307,7 @@
           <a:p>
             <a:fld id="{1C243D36-5217-48BF-A097-7AA0FC8B35E5}" type="datetimeFigureOut">
               <a:rPr lang="en-US" smtClean="0"/>
-              <a:t>6/27/2017</a:t>
+              <a:t>6/29/2017</a:t>
             </a:fld>
             <a:endParaRPr lang="en-US"/>
           </a:p>
@@ -475,7 +475,7 @@
           <a:p>
             <a:fld id="{1C243D36-5217-48BF-A097-7AA0FC8B35E5}" type="datetimeFigureOut">
               <a:rPr lang="en-US" smtClean="0"/>
-              <a:t>6/27/2017</a:t>
+              <a:t>6/29/2017</a:t>
             </a:fld>
             <a:endParaRPr lang="en-US"/>
           </a:p>
@@ -653,7 +653,7 @@
           <a:p>
             <a:fld id="{1C243D36-5217-48BF-A097-7AA0FC8B35E5}" type="datetimeFigureOut">
               <a:rPr lang="en-US" smtClean="0"/>
-              <a:t>6/27/2017</a:t>
+              <a:t>6/29/2017</a:t>
             </a:fld>
             <a:endParaRPr lang="en-US"/>
           </a:p>
@@ -821,7 +821,7 @@
           <a:p>
             <a:fld id="{1C243D36-5217-48BF-A097-7AA0FC8B35E5}" type="datetimeFigureOut">
               <a:rPr lang="en-US" smtClean="0"/>
-              <a:t>6/27/2017</a:t>
+              <a:t>6/29/2017</a:t>
             </a:fld>
             <a:endParaRPr lang="en-US"/>
           </a:p>
@@ -1066,7 +1066,7 @@
           <a:p>
             <a:fld id="{1C243D36-5217-48BF-A097-7AA0FC8B35E5}" type="datetimeFigureOut">
               <a:rPr lang="en-US" smtClean="0"/>
-              <a:t>6/27/2017</a:t>
+              <a:t>6/29/2017</a:t>
             </a:fld>
             <a:endParaRPr lang="en-US"/>
           </a:p>
@@ -1351,7 +1351,7 @@
           <a:p>
             <a:fld id="{1C243D36-5217-48BF-A097-7AA0FC8B35E5}" type="datetimeFigureOut">
               <a:rPr lang="en-US" smtClean="0"/>
-              <a:t>6/27/2017</a:t>
+              <a:t>6/29/2017</a:t>
             </a:fld>
             <a:endParaRPr lang="en-US"/>
           </a:p>
@@ -1775,7 +1775,7 @@
           <a:p>
             <a:fld id="{1C243D36-5217-48BF-A097-7AA0FC8B35E5}" type="datetimeFigureOut">
               <a:rPr lang="en-US" smtClean="0"/>
-              <a:t>6/27/2017</a:t>
+              <a:t>6/29/2017</a:t>
             </a:fld>
             <a:endParaRPr lang="en-US"/>
           </a:p>
@@ -1892,7 +1892,7 @@
           <a:p>
             <a:fld id="{1C243D36-5217-48BF-A097-7AA0FC8B35E5}" type="datetimeFigureOut">
               <a:rPr lang="en-US" smtClean="0"/>
-              <a:t>6/27/2017</a:t>
+              <a:t>6/29/2017</a:t>
             </a:fld>
             <a:endParaRPr lang="en-US"/>
           </a:p>
@@ -1987,7 +1987,7 @@
           <a:p>
             <a:fld id="{1C243D36-5217-48BF-A097-7AA0FC8B35E5}" type="datetimeFigureOut">
               <a:rPr lang="en-US" smtClean="0"/>
-              <a:t>6/27/2017</a:t>
+              <a:t>6/29/2017</a:t>
             </a:fld>
             <a:endParaRPr lang="en-US"/>
           </a:p>
@@ -2262,7 +2262,7 @@
           <a:p>
             <a:fld id="{1C243D36-5217-48BF-A097-7AA0FC8B35E5}" type="datetimeFigureOut">
               <a:rPr lang="en-US" smtClean="0"/>
-              <a:t>6/27/2017</a:t>
+              <a:t>6/29/2017</a:t>
             </a:fld>
             <a:endParaRPr lang="en-US"/>
           </a:p>
@@ -2514,7 +2514,7 @@
           <a:p>
             <a:fld id="{1C243D36-5217-48BF-A097-7AA0FC8B35E5}" type="datetimeFigureOut">
               <a:rPr lang="en-US" smtClean="0"/>
-              <a:t>6/27/2017</a:t>
+              <a:t>6/29/2017</a:t>
             </a:fld>
             <a:endParaRPr lang="en-US"/>
           </a:p>
@@ -2728,7 +2728,7 @@
           <a:p>
             <a:fld id="{1C243D36-5217-48BF-A097-7AA0FC8B35E5}" type="datetimeFigureOut">
               <a:rPr lang="en-US" smtClean="0"/>
-              <a:t>6/27/2017</a:t>
+              <a:t>6/29/2017</a:t>
             </a:fld>
             <a:endParaRPr lang="en-US"/>
           </a:p>
@@ -3223,7 +3223,7 @@
         </p:blipFill>
         <p:spPr>
           <a:xfrm>
-            <a:off x="1143000" y="838200"/>
+            <a:off x="1191038" y="1100616"/>
             <a:ext cx="1351722" cy="1372630"/>
           </a:xfrm>
           <a:prstGeom prst="rect">
@@ -3267,7 +3267,7 @@
         </p:blipFill>
         <p:spPr>
           <a:xfrm>
-            <a:off x="1143000" y="838200"/>
+            <a:off x="1191038" y="1100616"/>
             <a:ext cx="1351722" cy="1372630"/>
           </a:xfrm>
           <a:prstGeom prst="rect">
@@ -3620,7 +3620,7 @@
                                   <p:childTnLst>
                                     <p:animRot by="21600000">
                                       <p:cBhvr>
-                                        <p:cTn id="6" dur="3000" fill="hold"/>
+                                        <p:cTn id="6" dur="2500" fill="hold"/>
                                         <p:tgtEl>
                                           <p:spTgt spid="5"/>
                                         </p:tgtEl>
@@ -3635,7 +3635,7 @@
                               <p:par>
                                 <p:cTn id="7" presetID="10" presetClass="exit" presetSubtype="0" fill="hold" grpId="1" nodeType="withEffect">
                                   <p:stCondLst>
-                                    <p:cond delay="2000"/>
+                                    <p:cond delay="1500"/>
                                   </p:stCondLst>
                                   <p:childTnLst>
                                     <p:animEffect transition="out" filter="fade">
@@ -3670,7 +3670,7 @@
                               <p:par>
                                 <p:cTn id="10" presetID="10" presetClass="entr" presetSubtype="0" fill="hold" nodeType="withEffect">
                                   <p:stCondLst>
-                                    <p:cond delay="2000"/>
+                                    <p:cond delay="1500"/>
                                   </p:stCondLst>
                                   <p:childTnLst>
                                     <p:set>
@@ -3705,12 +3705,12 @@
                               <p:par>
                                 <p:cTn id="13" presetID="8" presetClass="emph" presetSubtype="0" fill="hold" nodeType="withEffect">
                                   <p:stCondLst>
-                                    <p:cond delay="2000"/>
+                                    <p:cond delay="1500"/>
                                   </p:stCondLst>
                                   <p:childTnLst>
                                     <p:animRot by="21600000">
                                       <p:cBhvr>
-                                        <p:cTn id="14" dur="3000" fill="hold"/>
+                                        <p:cTn id="14" dur="2500" fill="hold"/>
                                         <p:tgtEl>
                                           <p:spTgt spid="9"/>
                                         </p:tgtEl>

</xml_diff>